<commit_message>
Updated lesson #15 presentation
</commit_message>
<xml_diff>
--- a/Presentation/lesson-15.pptx
+++ b/Presentation/lesson-15.pptx
@@ -5,7 +5,7 @@
     <p:sldMasterId id="2147483648" r:id="rId1"/>
   </p:sldMasterIdLst>
   <p:notesMasterIdLst>
-    <p:notesMasterId r:id="rId17"/>
+    <p:notesMasterId r:id="rId18"/>
   </p:notesMasterIdLst>
   <p:sldIdLst>
     <p:sldId id="257" r:id="rId2"/>
@@ -13,16 +13,17 @@
     <p:sldId id="259" r:id="rId4"/>
     <p:sldId id="260" r:id="rId5"/>
     <p:sldId id="261" r:id="rId6"/>
-    <p:sldId id="262" r:id="rId7"/>
-    <p:sldId id="263" r:id="rId8"/>
-    <p:sldId id="265" r:id="rId9"/>
-    <p:sldId id="264" r:id="rId10"/>
-    <p:sldId id="266" r:id="rId11"/>
-    <p:sldId id="267" r:id="rId12"/>
-    <p:sldId id="268" r:id="rId13"/>
-    <p:sldId id="269" r:id="rId14"/>
-    <p:sldId id="270" r:id="rId15"/>
-    <p:sldId id="271" r:id="rId16"/>
+    <p:sldId id="272" r:id="rId7"/>
+    <p:sldId id="262" r:id="rId8"/>
+    <p:sldId id="263" r:id="rId9"/>
+    <p:sldId id="265" r:id="rId10"/>
+    <p:sldId id="264" r:id="rId11"/>
+    <p:sldId id="266" r:id="rId12"/>
+    <p:sldId id="267" r:id="rId13"/>
+    <p:sldId id="268" r:id="rId14"/>
+    <p:sldId id="269" r:id="rId15"/>
+    <p:sldId id="270" r:id="rId16"/>
+    <p:sldId id="271" r:id="rId17"/>
   </p:sldIdLst>
   <p:sldSz cx="9144000" cy="6858000" type="screen4x3"/>
   <p:notesSz cx="6858000" cy="9144000"/>
@@ -206,7 +207,7 @@
           <a:p>
             <a:fld id="{B24A7054-7FFB-49F4-A126-5DF6E687FF53}" type="datetimeFigureOut">
               <a:rPr lang="ru-RU" smtClean="0"/>
-              <a:t>12.09.2012</a:t>
+              <a:t>14.09.2012</a:t>
             </a:fld>
             <a:endParaRPr lang="ru-RU"/>
           </a:p>
@@ -1488,7 +1489,7 @@
           <a:p>
             <a:fld id="{8E6E6A2A-E9D3-4A0D-B04A-ABDD367A1E08}" type="datetimeFigureOut">
               <a:rPr lang="ru-RU" smtClean="0"/>
-              <a:t>12.09.2012</a:t>
+              <a:t>14.09.2012</a:t>
             </a:fld>
             <a:endParaRPr lang="ru-RU"/>
           </a:p>
@@ -2933,7 +2934,7 @@
           <a:p>
             <a:fld id="{AC3D3127-B7C4-45E3-9797-C527EC9FDD78}" type="datetimeFigureOut">
               <a:rPr lang="ru-RU" smtClean="0"/>
-              <a:t>12.09.2012</a:t>
+              <a:t>14.09.2012</a:t>
             </a:fld>
             <a:endParaRPr lang="ru-RU"/>
           </a:p>
@@ -3539,21 +3540,17 @@
           <a:p>
             <a:pPr marL="742950" indent="-742950">
               <a:buFont typeface="+mj-lt"/>
-              <a:buAutoNum type="arabicPeriod"/>
+              <a:buAutoNum type="arabicPeriod" startAt="3"/>
             </a:pPr>
             <a:r>
               <a:rPr lang="ru-RU" sz="3600" dirty="0"/>
-              <a:t>Структурные шаблоны (</a:t>
+              <a:t>Порождающие шаблоны (</a:t>
             </a:r>
             <a:r>
               <a:rPr lang="en-US" sz="3600" dirty="0"/>
-              <a:t>Structural</a:t>
-            </a:r>
-            <a:r>
-              <a:rPr lang="en-US" sz="3600" dirty="0" smtClean="0"/>
-              <a:t>)</a:t>
-            </a:r>
-            <a:endParaRPr lang="en-US" sz="3600" dirty="0"/>
+              <a:t>Creational)</a:t>
+            </a:r>
+            <a:endParaRPr lang="ru-RU" sz="3600" dirty="0"/>
           </a:p>
         </p:txBody>
       </p:sp>
@@ -3570,29 +3567,168 @@
         <p:spPr/>
         <p:txBody>
           <a:bodyPr>
-            <a:normAutofit lnSpcReduction="10000"/>
+            <a:normAutofit fontScale="70000" lnSpcReduction="20000"/>
           </a:bodyPr>
           <a:lstStyle/>
           <a:p>
-            <a:pPr marL="0" indent="0">
-              <a:buNone/>
-            </a:pPr>
-            <a:r>
-              <a:rPr lang="ru-RU" dirty="0" smtClean="0"/>
-              <a:t>Шаблоны </a:t>
+            <a:r>
+              <a:rPr lang="ru-RU" dirty="0" smtClean="0">
+                <a:solidFill>
+                  <a:srgbClr val="FFFF00"/>
+                </a:solidFill>
+              </a:rPr>
+              <a:t>Одиночка (Singleton</a:t>
+            </a:r>
+            <a:r>
+              <a:rPr lang="ru-RU" dirty="0">
+                <a:solidFill>
+                  <a:srgbClr val="FFFF00"/>
+                </a:solidFill>
+              </a:rPr>
+              <a:t>).</a:t>
             </a:r>
             <a:r>
               <a:rPr lang="ru-RU" dirty="0"/>
-              <a:t>проектирования, которые абстрагируют процесс инстанцирования. Они позволяют сделать систему независимой от способа создания, композиции и представления объектов. Шаблон, порождающий классы, использует наследование, чтобы изменять инстанцируемый класс, а шаблон, порождающий объекты, делегирует инстанцирование другому объекту.</a:t>
-            </a:r>
-            <a:endParaRPr lang="en-US" dirty="0"/>
+              <a:t> Класс, который может иметь только один экземпляр.</a:t>
+            </a:r>
+          </a:p>
+          <a:p>
+            <a:r>
+              <a:rPr lang="ru-RU" dirty="0">
+                <a:solidFill>
+                  <a:srgbClr val="FFFF00"/>
+                </a:solidFill>
+              </a:rPr>
+              <a:t>Пул </a:t>
+            </a:r>
+            <a:r>
+              <a:rPr lang="ru-RU" dirty="0" smtClean="0">
+                <a:solidFill>
+                  <a:srgbClr val="FFFF00"/>
+                </a:solidFill>
+              </a:rPr>
+              <a:t>одиночек (Multiton</a:t>
+            </a:r>
+            <a:r>
+              <a:rPr lang="ru-RU" dirty="0">
+                <a:solidFill>
+                  <a:srgbClr val="FFFF00"/>
+                </a:solidFill>
+              </a:rPr>
+              <a:t>).</a:t>
+            </a:r>
+            <a:r>
+              <a:rPr lang="ru-RU" dirty="0"/>
+              <a:t> Гарантирует, что класс имеет поименованные экземпляры объекта и обеспечивает глобальную точку доступа к ним .</a:t>
+            </a:r>
+          </a:p>
+          <a:p>
+            <a:r>
+              <a:rPr lang="ru-RU" dirty="0">
+                <a:solidFill>
+                  <a:srgbClr val="FFFF00"/>
+                </a:solidFill>
+              </a:rPr>
+              <a:t>Объектный </a:t>
+            </a:r>
+            <a:r>
+              <a:rPr lang="ru-RU" dirty="0" smtClean="0">
+                <a:solidFill>
+                  <a:srgbClr val="FFFF00"/>
+                </a:solidFill>
+              </a:rPr>
+              <a:t>пул (Object pool).</a:t>
+            </a:r>
+            <a:r>
+              <a:rPr lang="ru-RU" dirty="0" smtClean="0"/>
+              <a:t> Класс</a:t>
+            </a:r>
+            <a:r>
+              <a:rPr lang="ru-RU" dirty="0"/>
+              <a:t>, который представляет собой интерфейс для работы с набором инициализированных и готовых к использованию </a:t>
+            </a:r>
+            <a:r>
+              <a:rPr lang="ru-RU" dirty="0" smtClean="0"/>
+              <a:t>объектов.</a:t>
+            </a:r>
+            <a:endParaRPr lang="ru-RU" dirty="0"/>
+          </a:p>
+          <a:p>
+            <a:r>
+              <a:rPr lang="ru-RU" dirty="0" smtClean="0">
+                <a:solidFill>
+                  <a:srgbClr val="FFFF00"/>
+                </a:solidFill>
+              </a:rPr>
+              <a:t>Прототип (Prototype).</a:t>
+            </a:r>
+            <a:r>
+              <a:rPr lang="ru-RU" dirty="0" smtClean="0"/>
+              <a:t> Определяет </a:t>
+            </a:r>
+            <a:r>
+              <a:rPr lang="ru-RU" dirty="0"/>
+              <a:t>интерфейс создания объекта через клонирование другого объекта вместо создания через </a:t>
+            </a:r>
+            <a:r>
+              <a:rPr lang="ru-RU" dirty="0" smtClean="0"/>
+              <a:t>конструктор.</a:t>
+            </a:r>
+            <a:endParaRPr lang="ru-RU" dirty="0"/>
+          </a:p>
+          <a:p>
+            <a:r>
+              <a:rPr lang="ru-RU" dirty="0">
+                <a:solidFill>
+                  <a:srgbClr val="FFFF00"/>
+                </a:solidFill>
+              </a:rPr>
+              <a:t>Получение ресурса есть </a:t>
+            </a:r>
+            <a:r>
+              <a:rPr lang="ru-RU" dirty="0" smtClean="0">
+                <a:solidFill>
+                  <a:srgbClr val="FFFF00"/>
+                </a:solidFill>
+              </a:rPr>
+              <a:t>инициализация (Resource </a:t>
+            </a:r>
+            <a:r>
+              <a:rPr lang="ru-RU" dirty="0">
+                <a:solidFill>
+                  <a:srgbClr val="FFFF00"/>
+                </a:solidFill>
+              </a:rPr>
+              <a:t>acquisition is initialization (RAII</a:t>
+            </a:r>
+            <a:r>
+              <a:rPr lang="ru-RU" dirty="0" smtClean="0">
+                <a:solidFill>
+                  <a:srgbClr val="FFFF00"/>
+                </a:solidFill>
+              </a:rPr>
+              <a:t>)).</a:t>
+            </a:r>
+            <a:r>
+              <a:rPr lang="ru-RU" dirty="0" smtClean="0"/>
+              <a:t> Получение </a:t>
+            </a:r>
+            <a:r>
+              <a:rPr lang="ru-RU" dirty="0"/>
+              <a:t>некоторого ресурса совмещается с инициализацией, а освобождение — с уничтожением </a:t>
+            </a:r>
+            <a:r>
+              <a:rPr lang="ru-RU" dirty="0" smtClean="0"/>
+              <a:t>объекта.</a:t>
+            </a:r>
+            <a:endParaRPr lang="ru-RU" dirty="0"/>
           </a:p>
         </p:txBody>
       </p:sp>
     </p:spTree>
     <p:extLst>
       <p:ext uri="{BB962C8B-B14F-4D97-AF65-F5344CB8AC3E}">
-        <p14:creationId xmlns:p14="http://schemas.microsoft.com/office/powerpoint/2010/main" val="2463800246"/>
+        <p14:creationId xmlns:p14="http://schemas.microsoft.com/office/powerpoint/2010/main" val="3876317382"/>
       </p:ext>
     </p:extLst>
   </p:cSld>
@@ -3638,7 +3774,7 @@
           <a:p>
             <a:pPr marL="742950" indent="-742950">
               <a:buFont typeface="+mj-lt"/>
-              <a:buAutoNum type="arabicPeriod" startAt="2"/>
+              <a:buAutoNum type="arabicPeriod"/>
             </a:pPr>
             <a:r>
               <a:rPr lang="ru-RU" sz="3600" dirty="0"/>
@@ -3669,169 +3805,29 @@
         <p:spPr/>
         <p:txBody>
           <a:bodyPr>
-            <a:normAutofit fontScale="77500" lnSpcReduction="20000"/>
+            <a:normAutofit/>
           </a:bodyPr>
           <a:lstStyle/>
           <a:p>
-            <a:r>
-              <a:rPr lang="ru-RU" dirty="0">
-                <a:solidFill>
-                  <a:srgbClr val="FFFF00"/>
-                </a:solidFill>
-              </a:rPr>
-              <a:t>Адаптер </a:t>
-            </a:r>
-            <a:r>
-              <a:rPr lang="ru-RU" dirty="0" smtClean="0">
-                <a:solidFill>
-                  <a:srgbClr val="FFFF00"/>
-                </a:solidFill>
-              </a:rPr>
-              <a:t>(Adapter </a:t>
-            </a:r>
-            <a:r>
-              <a:rPr lang="ru-RU" dirty="0">
-                <a:solidFill>
-                  <a:srgbClr val="FFFF00"/>
-                </a:solidFill>
-              </a:rPr>
-              <a:t>/ </a:t>
-            </a:r>
-            <a:r>
-              <a:rPr lang="ru-RU" dirty="0" smtClean="0">
-                <a:solidFill>
-                  <a:srgbClr val="FFFF00"/>
-                </a:solidFill>
-              </a:rPr>
-              <a:t>Wrapper).</a:t>
-            </a:r>
-            <a:r>
-              <a:rPr lang="ru-RU" dirty="0" smtClean="0"/>
-              <a:t> </a:t>
+            <a:pPr marL="0" indent="0">
+              <a:buNone/>
+            </a:pPr>
+            <a:r>
+              <a:rPr lang="ru-RU" dirty="0" smtClean="0"/>
+              <a:t>Определяют </a:t>
             </a:r>
             <a:r>
               <a:rPr lang="ru-RU" dirty="0"/>
-              <a:t>Объект, обеспечивающий взаимодействие двух других объектов, один из которых использует, а другой предоставляет несовместимый с первым </a:t>
-            </a:r>
-            <a:r>
-              <a:rPr lang="ru-RU" dirty="0" smtClean="0"/>
-              <a:t>интерфейс.</a:t>
-            </a:r>
-            <a:endParaRPr lang="ru-RU" dirty="0"/>
-          </a:p>
-          <a:p>
-            <a:r>
-              <a:rPr lang="ru-RU" dirty="0">
-                <a:solidFill>
-                  <a:srgbClr val="FFFF00"/>
-                </a:solidFill>
-              </a:rPr>
-              <a:t>Мост </a:t>
-            </a:r>
-            <a:r>
-              <a:rPr lang="ru-RU" dirty="0" smtClean="0">
-                <a:solidFill>
-                  <a:srgbClr val="FFFF00"/>
-                </a:solidFill>
-              </a:rPr>
-              <a:t>(Bridge).</a:t>
-            </a:r>
-            <a:r>
-              <a:rPr lang="ru-RU" dirty="0" smtClean="0"/>
-              <a:t> </a:t>
-            </a:r>
-            <a:r>
-              <a:rPr lang="ru-RU" dirty="0"/>
-              <a:t>Структура, позволяющая изменять интерфейс обращения и интерфейс реализации класса независимо</a:t>
-            </a:r>
-          </a:p>
-          <a:p>
-            <a:r>
-              <a:rPr lang="ru-RU" dirty="0" smtClean="0">
-                <a:solidFill>
-                  <a:srgbClr val="FFFF00"/>
-                </a:solidFill>
-              </a:rPr>
-              <a:t>Компоновщик (Composite).</a:t>
-            </a:r>
-            <a:r>
-              <a:rPr lang="ru-RU" dirty="0" smtClean="0"/>
-              <a:t> </a:t>
-            </a:r>
-            <a:r>
-              <a:rPr lang="ru-RU" dirty="0"/>
-              <a:t>Объект, который объединяет в себе объекты, подобные ему самому</a:t>
-            </a:r>
-          </a:p>
-          <a:p>
-            <a:r>
-              <a:rPr lang="en-US" dirty="0" smtClean="0">
-                <a:solidFill>
-                  <a:srgbClr val="FFC000"/>
-                </a:solidFill>
-              </a:rPr>
-              <a:t>[C#]</a:t>
-            </a:r>
-            <a:r>
-              <a:rPr lang="en-US" dirty="0" smtClean="0">
-                <a:solidFill>
-                  <a:srgbClr val="FFFF00"/>
-                </a:solidFill>
-              </a:rPr>
-              <a:t> </a:t>
-            </a:r>
-            <a:r>
-              <a:rPr lang="ru-RU" dirty="0" smtClean="0">
-                <a:solidFill>
-                  <a:srgbClr val="FFFF00"/>
-                </a:solidFill>
-              </a:rPr>
-              <a:t>Декоратор (Decorator).</a:t>
-            </a:r>
-            <a:r>
-              <a:rPr lang="ru-RU" dirty="0" smtClean="0"/>
-              <a:t> </a:t>
-            </a:r>
-            <a:r>
-              <a:rPr lang="ru-RU" dirty="0"/>
-              <a:t>Класс, расширяющий функциональность другого класса без использования </a:t>
-            </a:r>
-            <a:r>
-              <a:rPr lang="ru-RU" dirty="0" smtClean="0"/>
-              <a:t>наследования.</a:t>
-            </a:r>
-            <a:r>
-              <a:rPr lang="en-US" dirty="0" smtClean="0"/>
-              <a:t> </a:t>
-            </a:r>
-            <a:r>
-              <a:rPr lang="en-US" dirty="0" smtClean="0">
-                <a:solidFill>
-                  <a:srgbClr val="FFC000"/>
-                </a:solidFill>
-              </a:rPr>
-              <a:t>Extension </a:t>
-            </a:r>
-            <a:r>
-              <a:rPr lang="ru-RU" dirty="0" smtClean="0">
-                <a:solidFill>
-                  <a:srgbClr val="FFC000"/>
-                </a:solidFill>
-              </a:rPr>
-              <a:t>методы.</a:t>
-            </a:r>
-            <a:endParaRPr lang="en-US" dirty="0">
-              <a:solidFill>
-                <a:srgbClr val="FFC000"/>
-              </a:solidFill>
-            </a:endParaRPr>
+              <a:t>различные сложные структуры, которые изменяют интерфейс уже существующих объектов или его реализацию, позволяя облегчить разработку и оптимизировать программу.</a:t>
+            </a:r>
+            <a:endParaRPr lang="en-US" dirty="0"/>
           </a:p>
         </p:txBody>
       </p:sp>
     </p:spTree>
     <p:extLst>
       <p:ext uri="{BB962C8B-B14F-4D97-AF65-F5344CB8AC3E}">
-        <p14:creationId xmlns:p14="http://schemas.microsoft.com/office/powerpoint/2010/main" val="1760599577"/>
+        <p14:creationId xmlns:p14="http://schemas.microsoft.com/office/powerpoint/2010/main" val="2463800246"/>
       </p:ext>
     </p:extLst>
   </p:cSld>
@@ -3877,7 +3873,7 @@
           <a:p>
             <a:pPr marL="742950" indent="-742950">
               <a:buFont typeface="+mj-lt"/>
-              <a:buAutoNum type="arabicPeriod" startAt="3"/>
+              <a:buAutoNum type="arabicPeriod" startAt="2"/>
             </a:pPr>
             <a:r>
               <a:rPr lang="ru-RU" sz="3600" dirty="0"/>
@@ -3908,17 +3904,41 @@
         <p:spPr/>
         <p:txBody>
           <a:bodyPr>
-            <a:normAutofit fontScale="70000" lnSpcReduction="20000"/>
+            <a:normAutofit fontScale="77500" lnSpcReduction="20000"/>
           </a:bodyPr>
           <a:lstStyle/>
           <a:p>
             <a:r>
+              <a:rPr lang="ru-RU" dirty="0">
+                <a:solidFill>
+                  <a:srgbClr val="FFFF00"/>
+                </a:solidFill>
+              </a:rPr>
+              <a:t>Адаптер </a:t>
+            </a:r>
+            <a:r>
               <a:rPr lang="ru-RU" dirty="0" smtClean="0">
                 <a:solidFill>
                   <a:srgbClr val="FFFF00"/>
                 </a:solidFill>
               </a:rPr>
-              <a:t>Фасад (Facade).</a:t>
+              <a:t>(Adapter </a:t>
+            </a:r>
+            <a:r>
+              <a:rPr lang="ru-RU" dirty="0">
+                <a:solidFill>
+                  <a:srgbClr val="FFFF00"/>
+                </a:solidFill>
+              </a:rPr>
+              <a:t>/ </a:t>
+            </a:r>
+            <a:r>
+              <a:rPr lang="ru-RU" dirty="0" smtClean="0">
+                <a:solidFill>
+                  <a:srgbClr val="FFFF00"/>
+                </a:solidFill>
+              </a:rPr>
+              <a:t>Wrapper).</a:t>
             </a:r>
             <a:r>
               <a:rPr lang="ru-RU" dirty="0" smtClean="0"/>
@@ -3926,11 +3946,11 @@
             </a:r>
             <a:r>
               <a:rPr lang="ru-RU" dirty="0"/>
-              <a:t>Объект, который абстрагирует работу с несколькими классами, объединяя их в единое </a:t>
-            </a:r>
-            <a:r>
-              <a:rPr lang="ru-RU" dirty="0" smtClean="0"/>
-              <a:t>целое.</a:t>
+              <a:t>Объект, обеспечивающий взаимодействие двух других объектов, один из которых использует, а другой предоставляет несовместимый с первым </a:t>
+            </a:r>
+            <a:r>
+              <a:rPr lang="ru-RU" dirty="0" smtClean="0"/>
+              <a:t>интерфейс.</a:t>
             </a:r>
             <a:endParaRPr lang="ru-RU" dirty="0"/>
           </a:p>
@@ -3941,7 +3961,7 @@
                   <a:srgbClr val="FFFF00"/>
                 </a:solidFill>
               </a:rPr>
-              <a:t>Единая точка входа </a:t>
+              <a:t>Мост </a:t>
             </a:r>
             <a:r>
               <a:rPr lang="ru-RU" dirty="0" smtClean="0">
@@ -3949,7 +3969,7 @@
                   <a:srgbClr val="FFFF00"/>
                 </a:solidFill>
               </a:rPr>
-              <a:t>(Front Controller).</a:t>
+              <a:t>(Bridge).</a:t>
             </a:r>
             <a:r>
               <a:rPr lang="ru-RU" dirty="0" smtClean="0"/>
@@ -3957,30 +3977,17 @@
             </a:r>
             <a:r>
               <a:rPr lang="ru-RU" dirty="0"/>
-              <a:t>Обеспечивает унифицированный интерфейс для интерфейсов в подсистеме. Front Controller определяет высокоуровневый интерфейс, упрощающий использование </a:t>
-            </a:r>
-            <a:r>
-              <a:rPr lang="ru-RU" dirty="0" smtClean="0"/>
-              <a:t>подсистемы.</a:t>
-            </a:r>
-            <a:endParaRPr lang="ru-RU" dirty="0"/>
-          </a:p>
-          <a:p>
-            <a:r>
-              <a:rPr lang="ru-RU" dirty="0">
-                <a:solidFill>
-                  <a:srgbClr val="FFFF00"/>
-                </a:solidFill>
-              </a:rPr>
-              <a:t>Приспособленец </a:t>
-            </a:r>
+              <a:t>Структура, позволяющая изменять интерфейс обращения и интерфейс реализации класса независимо</a:t>
+            </a:r>
+          </a:p>
+          <a:p>
             <a:r>
               <a:rPr lang="ru-RU" dirty="0" smtClean="0">
                 <a:solidFill>
                   <a:srgbClr val="FFFF00"/>
                 </a:solidFill>
               </a:rPr>
-              <a:t>(Flyweight).</a:t>
+              <a:t>Компоновщик (Composite).</a:t>
             </a:r>
             <a:r>
               <a:rPr lang="ru-RU" dirty="0" smtClean="0"/>
@@ -3988,22 +3995,33 @@
             </a:r>
             <a:r>
               <a:rPr lang="ru-RU" dirty="0"/>
-              <a:t>Это объект, представляющий себя как уникальный экземпляр в разных местах программы, но по факту не являющийся </a:t>
-            </a:r>
-            <a:r>
-              <a:rPr lang="ru-RU" dirty="0" smtClean="0"/>
-              <a:t>таковым.</a:t>
-            </a:r>
-            <a:endParaRPr lang="ru-RU" dirty="0"/>
-          </a:p>
-          <a:p>
+              <a:t>Объект, который объединяет в себе объекты, подобные ему самому</a:t>
+            </a:r>
+          </a:p>
+          <a:p>
+            <a:r>
+              <a:rPr lang="en-US" dirty="0" smtClean="0">
+                <a:solidFill>
+                  <a:srgbClr val="FFC000"/>
+                </a:solidFill>
+              </a:rPr>
+              <a:t>[C#]</a:t>
+            </a:r>
+            <a:r>
+              <a:rPr lang="en-US" dirty="0" smtClean="0">
+                <a:solidFill>
+                  <a:srgbClr val="FFFF00"/>
+                </a:solidFill>
+              </a:rPr>
+              <a:t> </a:t>
+            </a:r>
             <a:r>
               <a:rPr lang="ru-RU" dirty="0" smtClean="0">
                 <a:solidFill>
                   <a:srgbClr val="FFFF00"/>
                 </a:solidFill>
               </a:rPr>
-              <a:t>Заместитель (Proxy).</a:t>
+              <a:t>Декоратор (Decorator).</a:t>
             </a:r>
             <a:r>
               <a:rPr lang="ru-RU" dirty="0" smtClean="0"/>
@@ -4011,20 +4029,44 @@
             </a:r>
             <a:r>
               <a:rPr lang="ru-RU" dirty="0"/>
-              <a:t>Объект, который является посредником между двумя другими объектами, и который реализовывает/ограничивает доступ к объекту, к которому обращаются через </a:t>
-            </a:r>
-            <a:r>
-              <a:rPr lang="ru-RU" dirty="0" smtClean="0"/>
-              <a:t>него.</a:t>
-            </a:r>
-            <a:endParaRPr lang="en-US" dirty="0"/>
+              <a:t>Класс, расширяющий функциональность другого класса без использования </a:t>
+            </a:r>
+            <a:r>
+              <a:rPr lang="ru-RU" dirty="0" smtClean="0"/>
+              <a:t>наследования.</a:t>
+            </a:r>
+            <a:r>
+              <a:rPr lang="en-US" dirty="0" smtClean="0"/>
+              <a:t> </a:t>
+            </a:r>
+            <a:r>
+              <a:rPr lang="en-US" dirty="0" smtClean="0">
+                <a:solidFill>
+                  <a:srgbClr val="FFC000"/>
+                </a:solidFill>
+              </a:rPr>
+              <a:t>Extension </a:t>
+            </a:r>
+            <a:r>
+              <a:rPr lang="ru-RU" dirty="0" smtClean="0">
+                <a:solidFill>
+                  <a:srgbClr val="FFC000"/>
+                </a:solidFill>
+              </a:rPr>
+              <a:t>методы.</a:t>
+            </a:r>
+            <a:endParaRPr lang="en-US" dirty="0">
+              <a:solidFill>
+                <a:srgbClr val="FFC000"/>
+              </a:solidFill>
+            </a:endParaRPr>
           </a:p>
         </p:txBody>
       </p:sp>
     </p:spTree>
     <p:extLst>
       <p:ext uri="{BB962C8B-B14F-4D97-AF65-F5344CB8AC3E}">
-        <p14:creationId xmlns:p14="http://schemas.microsoft.com/office/powerpoint/2010/main" val="843854959"/>
+        <p14:creationId xmlns:p14="http://schemas.microsoft.com/office/powerpoint/2010/main" val="1760599577"/>
       </p:ext>
     </p:extLst>
   </p:cSld>
@@ -4070,14 +4112,18 @@
           <a:p>
             <a:pPr marL="742950" indent="-742950">
               <a:buFont typeface="+mj-lt"/>
-              <a:buAutoNum type="arabicPeriod"/>
+              <a:buAutoNum type="arabicPeriod" startAt="3"/>
             </a:pPr>
             <a:r>
               <a:rPr lang="ru-RU" sz="3600" dirty="0"/>
-              <a:t>Поведенческие шаблоны (Behavioral</a:t>
-            </a:r>
-            <a:r>
-              <a:rPr lang="ru-RU" sz="3600" dirty="0" smtClean="0"/>
+              <a:t>Структурные шаблоны (</a:t>
+            </a:r>
+            <a:r>
+              <a:rPr lang="en-US" sz="3600" dirty="0"/>
+              <a:t>Structural</a:t>
+            </a:r>
+            <a:r>
+              <a:rPr lang="en-US" sz="3600" dirty="0" smtClean="0"/>
               <a:t>)</a:t>
             </a:r>
             <a:endParaRPr lang="en-US" sz="3600" dirty="0"/>
@@ -4096,19 +4142,115 @@
         </p:nvSpPr>
         <p:spPr/>
         <p:txBody>
-          <a:bodyPr/>
+          <a:bodyPr>
+            <a:normAutofit fontScale="70000" lnSpcReduction="20000"/>
+          </a:bodyPr>
           <a:lstStyle/>
           <a:p>
-            <a:pPr marL="0" indent="0">
-              <a:buNone/>
-            </a:pPr>
-            <a:r>
-              <a:rPr lang="ru-RU" dirty="0" smtClean="0"/>
-              <a:t>Определяют </a:t>
+            <a:r>
+              <a:rPr lang="ru-RU" dirty="0" smtClean="0">
+                <a:solidFill>
+                  <a:srgbClr val="FFFF00"/>
+                </a:solidFill>
+              </a:rPr>
+              <a:t>Фасад (Facade).</a:t>
+            </a:r>
+            <a:r>
+              <a:rPr lang="ru-RU" dirty="0" smtClean="0"/>
+              <a:t> </a:t>
             </a:r>
             <a:r>
               <a:rPr lang="ru-RU" dirty="0"/>
-              <a:t>взаимодействие между объектами, увеличивая таким образом его гибкость.</a:t>
+              <a:t>Объект, который абстрагирует работу с несколькими классами, объединяя их в единое </a:t>
+            </a:r>
+            <a:r>
+              <a:rPr lang="ru-RU" dirty="0" smtClean="0"/>
+              <a:t>целое.</a:t>
+            </a:r>
+            <a:endParaRPr lang="ru-RU" dirty="0"/>
+          </a:p>
+          <a:p>
+            <a:r>
+              <a:rPr lang="ru-RU" dirty="0">
+                <a:solidFill>
+                  <a:srgbClr val="FFFF00"/>
+                </a:solidFill>
+              </a:rPr>
+              <a:t>Единая точка входа </a:t>
+            </a:r>
+            <a:r>
+              <a:rPr lang="ru-RU" dirty="0" smtClean="0">
+                <a:solidFill>
+                  <a:srgbClr val="FFFF00"/>
+                </a:solidFill>
+              </a:rPr>
+              <a:t>(Front Controller).</a:t>
+            </a:r>
+            <a:r>
+              <a:rPr lang="ru-RU" dirty="0" smtClean="0"/>
+              <a:t> </a:t>
+            </a:r>
+            <a:r>
+              <a:rPr lang="ru-RU" dirty="0"/>
+              <a:t>Обеспечивает унифицированный интерфейс для интерфейсов в подсистеме. Front Controller определяет высокоуровневый интерфейс, упрощающий использование </a:t>
+            </a:r>
+            <a:r>
+              <a:rPr lang="ru-RU" dirty="0" smtClean="0"/>
+              <a:t>подсистемы.</a:t>
+            </a:r>
+            <a:endParaRPr lang="ru-RU" dirty="0"/>
+          </a:p>
+          <a:p>
+            <a:r>
+              <a:rPr lang="ru-RU" dirty="0">
+                <a:solidFill>
+                  <a:srgbClr val="FFFF00"/>
+                </a:solidFill>
+              </a:rPr>
+              <a:t>Приспособленец </a:t>
+            </a:r>
+            <a:r>
+              <a:rPr lang="ru-RU" dirty="0" smtClean="0">
+                <a:solidFill>
+                  <a:srgbClr val="FFFF00"/>
+                </a:solidFill>
+              </a:rPr>
+              <a:t>(Flyweight).</a:t>
+            </a:r>
+            <a:r>
+              <a:rPr lang="ru-RU" dirty="0" smtClean="0"/>
+              <a:t> </a:t>
+            </a:r>
+            <a:r>
+              <a:rPr lang="ru-RU" dirty="0"/>
+              <a:t>Это объект, представляющий себя как уникальный экземпляр в разных местах программы, но по факту не являющийся </a:t>
+            </a:r>
+            <a:r>
+              <a:rPr lang="ru-RU" dirty="0" smtClean="0"/>
+              <a:t>таковым.</a:t>
+            </a:r>
+            <a:endParaRPr lang="ru-RU" dirty="0"/>
+          </a:p>
+          <a:p>
+            <a:r>
+              <a:rPr lang="ru-RU" dirty="0" smtClean="0">
+                <a:solidFill>
+                  <a:srgbClr val="FFFF00"/>
+                </a:solidFill>
+              </a:rPr>
+              <a:t>Заместитель (Proxy).</a:t>
+            </a:r>
+            <a:r>
+              <a:rPr lang="ru-RU" dirty="0" smtClean="0"/>
+              <a:t> </a:t>
+            </a:r>
+            <a:r>
+              <a:rPr lang="ru-RU" dirty="0"/>
+              <a:t>Объект, который является посредником между двумя другими объектами, и который реализовывает/ограничивает доступ к объекту, к которому обращаются через </a:t>
+            </a:r>
+            <a:r>
+              <a:rPr lang="ru-RU" dirty="0" smtClean="0"/>
+              <a:t>него.</a:t>
             </a:r>
             <a:endParaRPr lang="en-US" dirty="0"/>
           </a:p>
@@ -4117,7 +4259,7 @@
     </p:spTree>
     <p:extLst>
       <p:ext uri="{BB962C8B-B14F-4D97-AF65-F5344CB8AC3E}">
-        <p14:creationId xmlns:p14="http://schemas.microsoft.com/office/powerpoint/2010/main" val="1660261524"/>
+        <p14:creationId xmlns:p14="http://schemas.microsoft.com/office/powerpoint/2010/main" val="843854959"/>
       </p:ext>
     </p:extLst>
   </p:cSld>
@@ -4163,6 +4305,99 @@
           <a:p>
             <a:pPr marL="742950" indent="-742950">
               <a:buFont typeface="+mj-lt"/>
+              <a:buAutoNum type="arabicPeriod"/>
+            </a:pPr>
+            <a:r>
+              <a:rPr lang="ru-RU" sz="3600" dirty="0"/>
+              <a:t>Поведенческие шаблоны (Behavioral</a:t>
+            </a:r>
+            <a:r>
+              <a:rPr lang="ru-RU" sz="3600" dirty="0" smtClean="0"/>
+              <a:t>)</a:t>
+            </a:r>
+            <a:endParaRPr lang="en-US" sz="3600" dirty="0"/>
+          </a:p>
+        </p:txBody>
+      </p:sp>
+      <p:sp>
+        <p:nvSpPr>
+          <p:cNvPr id="3" name="Content Placeholder 2"/>
+          <p:cNvSpPr>
+            <a:spLocks noGrp="1"/>
+          </p:cNvSpPr>
+          <p:nvPr>
+            <p:ph idx="1"/>
+          </p:nvPr>
+        </p:nvSpPr>
+        <p:spPr/>
+        <p:txBody>
+          <a:bodyPr/>
+          <a:lstStyle/>
+          <a:p>
+            <a:pPr marL="0" indent="0">
+              <a:buNone/>
+            </a:pPr>
+            <a:r>
+              <a:rPr lang="ru-RU" dirty="0" smtClean="0"/>
+              <a:t>Определяют </a:t>
+            </a:r>
+            <a:r>
+              <a:rPr lang="ru-RU" dirty="0"/>
+              <a:t>взаимодействие между объектами, увеличивая таким образом его гибкость.</a:t>
+            </a:r>
+            <a:endParaRPr lang="en-US" dirty="0"/>
+          </a:p>
+        </p:txBody>
+      </p:sp>
+    </p:spTree>
+    <p:extLst>
+      <p:ext uri="{BB962C8B-B14F-4D97-AF65-F5344CB8AC3E}">
+        <p14:creationId xmlns:p14="http://schemas.microsoft.com/office/powerpoint/2010/main" val="1660261524"/>
+      </p:ext>
+    </p:extLst>
+  </p:cSld>
+  <p:clrMapOvr>
+    <a:masterClrMapping/>
+  </p:clrMapOvr>
+</p:sld>
+</file>
+
+<file path=ppt/slides/slide15.xml><?xml version="1.0" encoding="utf-8"?>
+<p:sld xmlns:a="http://schemas.openxmlformats.org/drawingml/2006/main" xmlns:r="http://schemas.openxmlformats.org/officeDocument/2006/relationships" xmlns:p="http://schemas.openxmlformats.org/presentationml/2006/main">
+  <p:cSld>
+    <p:spTree>
+      <p:nvGrpSpPr>
+        <p:cNvPr id="1" name=""/>
+        <p:cNvGrpSpPr/>
+        <p:nvPr/>
+      </p:nvGrpSpPr>
+      <p:grpSpPr>
+        <a:xfrm>
+          <a:off x="0" y="0"/>
+          <a:ext cx="0" cy="0"/>
+          <a:chOff x="0" y="0"/>
+          <a:chExt cx="0" cy="0"/>
+        </a:xfrm>
+      </p:grpSpPr>
+      <p:sp>
+        <p:nvSpPr>
+          <p:cNvPr id="2" name="Title 1"/>
+          <p:cNvSpPr>
+            <a:spLocks noGrp="1"/>
+          </p:cNvSpPr>
+          <p:nvPr>
+            <p:ph type="title"/>
+          </p:nvPr>
+        </p:nvSpPr>
+        <p:spPr/>
+        <p:txBody>
+          <a:bodyPr>
+            <a:normAutofit/>
+          </a:bodyPr>
+          <a:lstStyle/>
+          <a:p>
+            <a:pPr marL="742950" indent="-742950">
+              <a:buFont typeface="+mj-lt"/>
               <a:buAutoNum type="arabicPeriod" startAt="2"/>
             </a:pPr>
             <a:r>
@@ -4495,7 +4730,7 @@
 </p:sld>
 </file>
 
-<file path=ppt/slides/slide15.xml><?xml version="1.0" encoding="utf-8"?>
+<file path=ppt/slides/slide16.xml><?xml version="1.0" encoding="utf-8"?>
 <p:sld xmlns:a="http://schemas.openxmlformats.org/drawingml/2006/main" xmlns:r="http://schemas.openxmlformats.org/officeDocument/2006/relationships" xmlns:p="http://schemas.openxmlformats.org/presentationml/2006/main">
   <p:cSld>
     <p:spTree>
@@ -5355,20 +5590,14 @@
         </p:nvSpPr>
         <p:spPr/>
         <p:txBody>
-          <a:bodyPr>
-            <a:normAutofit/>
-          </a:bodyPr>
+          <a:bodyPr/>
           <a:lstStyle/>
           <a:p>
             <a:r>
-              <a:rPr lang="ru-RU" sz="4000" dirty="0"/>
-              <a:t>Основные шаблоны (</a:t>
-            </a:r>
-            <a:r>
-              <a:rPr lang="en-US" sz="4000" dirty="0"/>
-              <a:t>Fundamental)</a:t>
-            </a:r>
-            <a:endParaRPr lang="ru-RU" sz="4000" dirty="0"/>
+              <a:rPr lang="ru-RU" dirty="0"/>
+              <a:t>Типы шаблонов проектирования</a:t>
+            </a:r>
+            <a:endParaRPr lang="en-US" dirty="0"/>
           </a:p>
         </p:txBody>
       </p:sp>
@@ -5384,149 +5613,41 @@
         </p:nvSpPr>
         <p:spPr/>
         <p:txBody>
-          <a:bodyPr>
-            <a:normAutofit fontScale="85000" lnSpcReduction="20000"/>
-          </a:bodyPr>
+          <a:bodyPr/>
           <a:lstStyle/>
           <a:p>
             <a:r>
-              <a:rPr lang="en-US" dirty="0" smtClean="0">
-                <a:solidFill>
-                  <a:srgbClr val="FFC000"/>
-                </a:solidFill>
-              </a:rPr>
-              <a:t>[.NET]</a:t>
-            </a:r>
-            <a:r>
-              <a:rPr lang="en-US" dirty="0" smtClean="0">
-                <a:solidFill>
-                  <a:schemeClr val="bg1"/>
-                </a:solidFill>
-              </a:rPr>
-              <a:t> </a:t>
-            </a:r>
-            <a:r>
-              <a:rPr lang="ru-RU" dirty="0" smtClean="0">
-                <a:solidFill>
-                  <a:srgbClr val="FFFF00"/>
-                </a:solidFill>
-              </a:rPr>
-              <a:t>Шаблон </a:t>
-            </a:r>
-            <a:r>
-              <a:rPr lang="ru-RU" dirty="0" smtClean="0">
-                <a:solidFill>
-                  <a:srgbClr val="FFFF00"/>
-                </a:solidFill>
-              </a:rPr>
-              <a:t>делегирования (Delegation pattern).</a:t>
-            </a:r>
-            <a:r>
-              <a:rPr lang="ru-RU" dirty="0" smtClean="0"/>
-              <a:t> Объект внешне </a:t>
-            </a:r>
-            <a:r>
-              <a:rPr lang="ru-RU" dirty="0"/>
-              <a:t>выражает некоторое поведение, но в реальности передаёт ответственность за выполнение этого поведения связанному </a:t>
-            </a:r>
-            <a:r>
-              <a:rPr lang="ru-RU" dirty="0" smtClean="0"/>
-              <a:t>объекту.</a:t>
-            </a:r>
-            <a:endParaRPr lang="ru-RU" dirty="0"/>
-          </a:p>
-          <a:p>
-            <a:r>
-              <a:rPr lang="ru-RU" dirty="0" smtClean="0">
-                <a:solidFill>
-                  <a:srgbClr val="FFFF00"/>
-                </a:solidFill>
-              </a:rPr>
-              <a:t>Шаблон </a:t>
-            </a:r>
-            <a:r>
-              <a:rPr lang="ru-RU" dirty="0">
-                <a:solidFill>
-                  <a:srgbClr val="FFFF00"/>
-                </a:solidFill>
-              </a:rPr>
-              <a:t>функционального </a:t>
-            </a:r>
-            <a:r>
-              <a:rPr lang="ru-RU" dirty="0" smtClean="0">
-                <a:solidFill>
-                  <a:srgbClr val="FFFF00"/>
-                </a:solidFill>
-              </a:rPr>
-              <a:t>дизайна (Functional design).</a:t>
-            </a:r>
-            <a:r>
-              <a:rPr lang="ru-RU" dirty="0" smtClean="0"/>
-              <a:t> Гарантирует</a:t>
-            </a:r>
-            <a:r>
-              <a:rPr lang="ru-RU" dirty="0"/>
-              <a:t>, что каждый модуль </a:t>
-            </a:r>
-            <a:r>
-              <a:rPr lang="ru-RU" dirty="0" smtClean="0"/>
-              <a:t>компьютерной программы </a:t>
-            </a:r>
-            <a:r>
-              <a:rPr lang="ru-RU" dirty="0"/>
-              <a:t>имеет только одну обязанность и исполняет её с минимумом побочных эффектов на другие части </a:t>
-            </a:r>
-            <a:r>
-              <a:rPr lang="ru-RU" dirty="0" smtClean="0"/>
-              <a:t>программы.</a:t>
-            </a:r>
-            <a:endParaRPr lang="ru-RU" dirty="0"/>
-          </a:p>
-          <a:p>
-            <a:r>
-              <a:rPr lang="en-US" dirty="0" smtClean="0">
-                <a:solidFill>
-                  <a:srgbClr val="FFC000"/>
-                </a:solidFill>
-              </a:rPr>
-              <a:t>[F#] </a:t>
-            </a:r>
-            <a:r>
-              <a:rPr lang="ru-RU" dirty="0" smtClean="0">
-                <a:solidFill>
-                  <a:srgbClr val="FFFF00"/>
-                </a:solidFill>
-              </a:rPr>
-              <a:t>Неизменяемый </a:t>
-            </a:r>
-            <a:r>
-              <a:rPr lang="ru-RU" dirty="0" smtClean="0">
-                <a:solidFill>
-                  <a:srgbClr val="FFFF00"/>
-                </a:solidFill>
-              </a:rPr>
-              <a:t>объект (Immutable).</a:t>
-            </a:r>
-            <a:r>
-              <a:rPr lang="ru-RU" dirty="0" smtClean="0"/>
-              <a:t> Объект</a:t>
-            </a:r>
-            <a:r>
-              <a:rPr lang="ru-RU" dirty="0"/>
-              <a:t>, который не может быть изменён после своего </a:t>
-            </a:r>
-            <a:r>
-              <a:rPr lang="ru-RU" dirty="0" smtClean="0"/>
-              <a:t>создания.</a:t>
-            </a:r>
-            <a:endParaRPr lang="ru-RU" dirty="0"/>
+              <a:rPr lang="ru-RU" dirty="0" smtClean="0"/>
+              <a:t>Основные</a:t>
+            </a:r>
+          </a:p>
+          <a:p>
+            <a:r>
+              <a:rPr lang="ru-RU" dirty="0" smtClean="0"/>
+              <a:t>Порождающие</a:t>
+            </a:r>
+          </a:p>
+          <a:p>
+            <a:r>
+              <a:rPr lang="ru-RU" dirty="0" smtClean="0"/>
+              <a:t>Структурные</a:t>
+            </a:r>
+          </a:p>
+          <a:p>
+            <a:r>
+              <a:rPr lang="ru-RU" dirty="0" smtClean="0"/>
+              <a:t>Поведенческие</a:t>
+            </a:r>
+          </a:p>
+          <a:p>
+            <a:endParaRPr lang="en-US" dirty="0"/>
           </a:p>
         </p:txBody>
       </p:sp>
     </p:spTree>
     <p:extLst>
       <p:ext uri="{BB962C8B-B14F-4D97-AF65-F5344CB8AC3E}">
-        <p14:creationId xmlns:p14="http://schemas.microsoft.com/office/powerpoint/2010/main" val="632874674"/>
+        <p14:creationId xmlns:p14="http://schemas.microsoft.com/office/powerpoint/2010/main" val="3252191658"/>
       </p:ext>
     </p:extLst>
   </p:cSld>
@@ -5570,19 +5691,15 @@
           </a:bodyPr>
           <a:lstStyle/>
           <a:p>
-            <a:pPr marL="742950" indent="-742950">
-              <a:buFont typeface="+mj-lt"/>
-              <a:buAutoNum type="arabicPeriod"/>
-            </a:pPr>
-            <a:r>
-              <a:rPr lang="ru-RU" sz="3600" dirty="0"/>
-              <a:t>Порождающие шаблоны (</a:t>
-            </a:r>
-            <a:r>
-              <a:rPr lang="en-US" sz="3600" dirty="0"/>
-              <a:t>Creational)</a:t>
-            </a:r>
-            <a:endParaRPr lang="ru-RU" sz="3600" dirty="0"/>
+            <a:r>
+              <a:rPr lang="ru-RU" sz="4000" dirty="0"/>
+              <a:t>Основные шаблоны (</a:t>
+            </a:r>
+            <a:r>
+              <a:rPr lang="en-US" sz="4000" dirty="0"/>
+              <a:t>Fundamental)</a:t>
+            </a:r>
+            <a:endParaRPr lang="ru-RU" sz="4000" dirty="0"/>
           </a:p>
         </p:txBody>
       </p:sp>
@@ -5599,20 +5716,123 @@
         <p:spPr/>
         <p:txBody>
           <a:bodyPr>
-            <a:normAutofit lnSpcReduction="10000"/>
+            <a:normAutofit fontScale="85000" lnSpcReduction="20000"/>
           </a:bodyPr>
           <a:lstStyle/>
           <a:p>
-            <a:pPr marL="0" indent="0">
-              <a:buNone/>
-            </a:pPr>
-            <a:r>
-              <a:rPr lang="ru-RU" dirty="0" smtClean="0"/>
-              <a:t>Шаблоны </a:t>
+            <a:r>
+              <a:rPr lang="en-US" dirty="0" smtClean="0">
+                <a:solidFill>
+                  <a:srgbClr val="FFC000"/>
+                </a:solidFill>
+              </a:rPr>
+              <a:t>[.NET]</a:t>
+            </a:r>
+            <a:r>
+              <a:rPr lang="en-US" dirty="0" smtClean="0">
+                <a:solidFill>
+                  <a:schemeClr val="bg1"/>
+                </a:solidFill>
+              </a:rPr>
+              <a:t> </a:t>
+            </a:r>
+            <a:r>
+              <a:rPr lang="ru-RU" dirty="0" smtClean="0">
+                <a:solidFill>
+                  <a:srgbClr val="FFFF00"/>
+                </a:solidFill>
+              </a:rPr>
+              <a:t>Шаблон делегирования (Delegation pattern).</a:t>
+            </a:r>
+            <a:r>
+              <a:rPr lang="ru-RU" dirty="0" smtClean="0"/>
+              <a:t> Объект внешне </a:t>
             </a:r>
             <a:r>
               <a:rPr lang="ru-RU" dirty="0"/>
-              <a:t>проектирования, которые абстрагируют процесс инстанцирования. Они позволяют сделать систему независимой от способа создания, композиции и представления объектов. Шаблон, порождающий классы, использует наследование, чтобы изменять инстанцируемый класс, а шаблон, порождающий объекты, делегирует инстанцирование другому объекту.</a:t>
+              <a:t>выражает некоторое поведение, но в реальности передаёт ответственность за выполнение этого поведения связанному </a:t>
+            </a:r>
+            <a:r>
+              <a:rPr lang="ru-RU" dirty="0" smtClean="0"/>
+              <a:t>объекту.</a:t>
+            </a:r>
+            <a:endParaRPr lang="ru-RU" dirty="0"/>
+          </a:p>
+          <a:p>
+            <a:r>
+              <a:rPr lang="ru-RU" dirty="0" smtClean="0">
+                <a:solidFill>
+                  <a:srgbClr val="FFFF00"/>
+                </a:solidFill>
+              </a:rPr>
+              <a:t>Шаблон </a:t>
+            </a:r>
+            <a:r>
+              <a:rPr lang="ru-RU" dirty="0">
+                <a:solidFill>
+                  <a:srgbClr val="FFFF00"/>
+                </a:solidFill>
+              </a:rPr>
+              <a:t>функционального </a:t>
+            </a:r>
+            <a:r>
+              <a:rPr lang="ru-RU" dirty="0" smtClean="0">
+                <a:solidFill>
+                  <a:srgbClr val="FFFF00"/>
+                </a:solidFill>
+              </a:rPr>
+              <a:t>дизайна (Functional design).</a:t>
+            </a:r>
+            <a:r>
+              <a:rPr lang="ru-RU" dirty="0" smtClean="0"/>
+              <a:t> Гарантирует</a:t>
+            </a:r>
+            <a:r>
+              <a:rPr lang="ru-RU" dirty="0"/>
+              <a:t>, что каждый модуль </a:t>
+            </a:r>
+            <a:r>
+              <a:rPr lang="ru-RU" dirty="0" smtClean="0"/>
+              <a:t>компьютерной программы </a:t>
+            </a:r>
+            <a:r>
+              <a:rPr lang="ru-RU" dirty="0"/>
+              <a:t>имеет только одну обязанность и исполняет её с минимумом побочных эффектов на другие части </a:t>
+            </a:r>
+            <a:r>
+              <a:rPr lang="ru-RU" dirty="0" smtClean="0"/>
+              <a:t>программы.</a:t>
+            </a:r>
+            <a:endParaRPr lang="ru-RU" dirty="0"/>
+          </a:p>
+          <a:p>
+            <a:r>
+              <a:rPr lang="en-US" dirty="0" smtClean="0">
+                <a:solidFill>
+                  <a:srgbClr val="FFC000"/>
+                </a:solidFill>
+              </a:rPr>
+              <a:t>[F#] </a:t>
+            </a:r>
+            <a:r>
+              <a:rPr lang="ru-RU" dirty="0" smtClean="0">
+                <a:solidFill>
+                  <a:srgbClr val="FFFF00"/>
+                </a:solidFill>
+              </a:rPr>
+              <a:t>Неизменяемый объект (Immutable).</a:t>
+            </a:r>
+            <a:r>
+              <a:rPr lang="ru-RU" dirty="0" smtClean="0"/>
+              <a:t> Объект</a:t>
+            </a:r>
+            <a:r>
+              <a:rPr lang="ru-RU" dirty="0"/>
+              <a:t>, который не может быть изменён после своего </a:t>
+            </a:r>
+            <a:r>
+              <a:rPr lang="ru-RU" dirty="0" smtClean="0"/>
+              <a:t>создания.</a:t>
             </a:r>
             <a:endParaRPr lang="ru-RU" dirty="0"/>
           </a:p>
@@ -5621,7 +5841,7 @@
     </p:spTree>
     <p:extLst>
       <p:ext uri="{BB962C8B-B14F-4D97-AF65-F5344CB8AC3E}">
-        <p14:creationId xmlns:p14="http://schemas.microsoft.com/office/powerpoint/2010/main" val="2711097098"/>
+        <p14:creationId xmlns:p14="http://schemas.microsoft.com/office/powerpoint/2010/main" val="632874674"/>
       </p:ext>
     </p:extLst>
   </p:cSld>
@@ -5667,7 +5887,7 @@
           <a:p>
             <a:pPr marL="742950" indent="-742950">
               <a:buFont typeface="+mj-lt"/>
-              <a:buAutoNum type="arabicPeriod" startAt="2"/>
+              <a:buAutoNum type="arabicPeriod"/>
             </a:pPr>
             <a:r>
               <a:rPr lang="ru-RU" sz="3600" dirty="0"/>
@@ -5694,179 +5914,28 @@
         <p:spPr/>
         <p:txBody>
           <a:bodyPr>
-            <a:normAutofit fontScale="85000" lnSpcReduction="20000"/>
+            <a:normAutofit lnSpcReduction="10000"/>
           </a:bodyPr>
           <a:lstStyle/>
           <a:p>
-            <a:r>
-              <a:rPr lang="ru-RU" dirty="0" smtClean="0">
-                <a:solidFill>
-                  <a:srgbClr val="FFFF00"/>
-                </a:solidFill>
-              </a:rPr>
-              <a:t>Абстрактная </a:t>
-            </a:r>
-            <a:r>
-              <a:rPr lang="ru-RU" dirty="0" smtClean="0">
-                <a:solidFill>
-                  <a:srgbClr val="FFFF00"/>
-                </a:solidFill>
-              </a:rPr>
-              <a:t>фабрика (Abstract factory).</a:t>
-            </a:r>
-            <a:r>
-              <a:rPr lang="ru-RU" dirty="0" smtClean="0"/>
-              <a:t> Класс</a:t>
+            <a:pPr marL="0" indent="0">
+              <a:buNone/>
+            </a:pPr>
+            <a:r>
+              <a:rPr lang="ru-RU" dirty="0" smtClean="0"/>
+              <a:t>Шаблоны </a:t>
             </a:r>
             <a:r>
               <a:rPr lang="ru-RU" dirty="0"/>
-              <a:t>, который представляет собой интерфейс для создания компонентов системы. </a:t>
-            </a:r>
-            <a:endParaRPr lang="ru-RU" dirty="0" smtClean="0"/>
-          </a:p>
-          <a:p>
-            <a:r>
-              <a:rPr lang="ru-RU" dirty="0" smtClean="0">
-                <a:solidFill>
-                  <a:srgbClr val="FFFF00"/>
-                </a:solidFill>
-              </a:rPr>
-              <a:t>Строитель </a:t>
-            </a:r>
-            <a:r>
-              <a:rPr lang="ru-RU" dirty="0" smtClean="0">
-                <a:solidFill>
-                  <a:srgbClr val="FFFF00"/>
-                </a:solidFill>
-              </a:rPr>
-              <a:t>(Builder).</a:t>
-            </a:r>
-            <a:r>
-              <a:rPr lang="ru-RU" dirty="0" smtClean="0"/>
-              <a:t> Класс</a:t>
-            </a:r>
-            <a:r>
-              <a:rPr lang="ru-RU" dirty="0"/>
-              <a:t>, который представляет собой интерфейс для создания сложного </a:t>
-            </a:r>
-            <a:r>
-              <a:rPr lang="ru-RU" dirty="0" smtClean="0"/>
-              <a:t>объекта.</a:t>
-            </a:r>
-            <a:endParaRPr lang="ru-RU" dirty="0"/>
-          </a:p>
-          <a:p>
-            <a:r>
-              <a:rPr lang="ru-RU" dirty="0" smtClean="0">
-                <a:solidFill>
-                  <a:srgbClr val="FFFF00"/>
-                </a:solidFill>
-              </a:rPr>
-              <a:t>Фабричный </a:t>
-            </a:r>
-            <a:r>
-              <a:rPr lang="ru-RU" dirty="0" smtClean="0">
-                <a:solidFill>
-                  <a:srgbClr val="FFFF00"/>
-                </a:solidFill>
-              </a:rPr>
-              <a:t>метод (Factory method).</a:t>
-            </a:r>
-            <a:r>
-              <a:rPr lang="ru-RU" dirty="0" smtClean="0"/>
-              <a:t> Определяет </a:t>
-            </a:r>
-            <a:r>
-              <a:rPr lang="ru-RU" dirty="0"/>
-              <a:t>интерфейс для создания объекта, но оставляет подклассам решение о том, какой класс </a:t>
-            </a:r>
-            <a:r>
-              <a:rPr lang="ru-RU" dirty="0" smtClean="0"/>
-              <a:t>инстанциировать.</a:t>
-            </a:r>
-            <a:endParaRPr lang="ru-RU" dirty="0"/>
-          </a:p>
-          <a:p>
-            <a:r>
-              <a:rPr lang="en-US" dirty="0">
-                <a:solidFill>
-                  <a:srgbClr val="FFC000"/>
-                </a:solidFill>
-              </a:rPr>
-              <a:t>[.NET]</a:t>
-            </a:r>
-            <a:r>
-              <a:rPr lang="en-US" dirty="0">
-                <a:solidFill>
-                  <a:schemeClr val="bg1"/>
-                </a:solidFill>
-              </a:rPr>
-              <a:t> </a:t>
-            </a:r>
-            <a:r>
-              <a:rPr lang="ru-RU" dirty="0" smtClean="0">
-                <a:solidFill>
-                  <a:srgbClr val="FFFF00"/>
-                </a:solidFill>
-              </a:rPr>
-              <a:t>Отложенная </a:t>
-            </a:r>
-            <a:r>
-              <a:rPr lang="ru-RU" dirty="0" smtClean="0">
-                <a:solidFill>
-                  <a:srgbClr val="FFFF00"/>
-                </a:solidFill>
-              </a:rPr>
-              <a:t>инициализация (Lazy initialization).</a:t>
-            </a:r>
-            <a:r>
-              <a:rPr lang="ru-RU" dirty="0" smtClean="0"/>
-              <a:t> Объект</a:t>
-            </a:r>
-            <a:r>
-              <a:rPr lang="ru-RU" dirty="0"/>
-              <a:t>, инициализируемый во время первого обращения к </a:t>
-            </a:r>
-            <a:r>
-              <a:rPr lang="ru-RU" dirty="0" smtClean="0"/>
-              <a:t>нему</a:t>
-            </a:r>
-            <a:r>
-              <a:rPr lang="ru-RU" dirty="0" smtClean="0"/>
-              <a:t>.</a:t>
-            </a:r>
-            <a:r>
-              <a:rPr lang="en-US" dirty="0" smtClean="0"/>
-              <a:t> </a:t>
-            </a:r>
-            <a:r>
-              <a:rPr lang="en-US" dirty="0" err="1" smtClean="0">
-                <a:solidFill>
-                  <a:srgbClr val="FFC000"/>
-                </a:solidFill>
-              </a:rPr>
-              <a:t>System.Lazy</a:t>
-            </a:r>
-            <a:r>
-              <a:rPr lang="en-US" dirty="0" smtClean="0">
-                <a:solidFill>
-                  <a:srgbClr val="FFC000"/>
-                </a:solidFill>
-              </a:rPr>
-              <a:t>&lt;T&gt;.</a:t>
-            </a:r>
-            <a:endParaRPr lang="ru-RU" dirty="0">
-              <a:solidFill>
-                <a:srgbClr val="FFC000"/>
-              </a:solidFill>
-            </a:endParaRPr>
+              <a:t>проектирования, которые абстрагируют процесс инстанцирования. Они позволяют сделать систему независимой от способа создания, композиции и представления объектов. Шаблон, порождающий классы, использует наследование, чтобы изменять инстанцируемый класс, а шаблон, порождающий объекты, делегирует инстанцирование другому объекту.</a:t>
+            </a:r>
           </a:p>
         </p:txBody>
       </p:sp>
     </p:spTree>
     <p:extLst>
       <p:ext uri="{BB962C8B-B14F-4D97-AF65-F5344CB8AC3E}">
-        <p14:creationId xmlns:p14="http://schemas.microsoft.com/office/powerpoint/2010/main" val="4068049520"/>
+        <p14:creationId xmlns:p14="http://schemas.microsoft.com/office/powerpoint/2010/main" val="2711097098"/>
       </p:ext>
     </p:extLst>
   </p:cSld>
@@ -5912,7 +5981,7 @@
           <a:p>
             <a:pPr marL="742950" indent="-742950">
               <a:buFont typeface="+mj-lt"/>
-              <a:buAutoNum type="arabicPeriod" startAt="3"/>
+              <a:buAutoNum type="arabicPeriod" startAt="2"/>
             </a:pPr>
             <a:r>
               <a:rPr lang="ru-RU" sz="3600" dirty="0"/>
@@ -5939,7 +6008,7 @@
         <p:spPr/>
         <p:txBody>
           <a:bodyPr>
-            <a:normAutofit fontScale="70000" lnSpcReduction="20000"/>
+            <a:normAutofit fontScale="85000" lnSpcReduction="20000"/>
           </a:bodyPr>
           <a:lstStyle/>
           <a:p>
@@ -5949,158 +6018,133 @@
                   <a:srgbClr val="FFFF00"/>
                 </a:solidFill>
               </a:rPr>
-              <a:t>Одиночка (Singleton</a:t>
-            </a:r>
-            <a:r>
-              <a:rPr lang="ru-RU" dirty="0">
-                <a:solidFill>
-                  <a:srgbClr val="FFFF00"/>
-                </a:solidFill>
-              </a:rPr>
-              <a:t>).</a:t>
+              <a:t>Абстрактная фабрика (Abstract factory).</a:t>
+            </a:r>
+            <a:r>
+              <a:rPr lang="ru-RU" dirty="0" smtClean="0"/>
+              <a:t> Класс</a:t>
             </a:r>
             <a:r>
               <a:rPr lang="ru-RU" dirty="0"/>
-              <a:t> Класс, который может иметь только один экземпляр.</a:t>
-            </a:r>
-          </a:p>
-          <a:p>
-            <a:r>
-              <a:rPr lang="ru-RU" dirty="0">
-                <a:solidFill>
-                  <a:srgbClr val="FFFF00"/>
-                </a:solidFill>
-              </a:rPr>
-              <a:t>Пул </a:t>
-            </a:r>
+              <a:t>, который представляет собой интерфейс для создания компонентов системы. </a:t>
+            </a:r>
+            <a:endParaRPr lang="ru-RU" dirty="0" smtClean="0"/>
+          </a:p>
+          <a:p>
             <a:r>
               <a:rPr lang="ru-RU" dirty="0" smtClean="0">
                 <a:solidFill>
                   <a:srgbClr val="FFFF00"/>
                 </a:solidFill>
               </a:rPr>
-              <a:t>одиночек (Multiton</a:t>
-            </a:r>
-            <a:r>
-              <a:rPr lang="ru-RU" dirty="0">
-                <a:solidFill>
-                  <a:srgbClr val="FFFF00"/>
-                </a:solidFill>
-              </a:rPr>
-              <a:t>).</a:t>
+              <a:t>Строитель (Builder).</a:t>
+            </a:r>
+            <a:r>
+              <a:rPr lang="ru-RU" dirty="0" smtClean="0"/>
+              <a:t> Класс</a:t>
             </a:r>
             <a:r>
               <a:rPr lang="ru-RU" dirty="0"/>
-              <a:t> Гарантирует, что класс имеет поименованные экземпляры объекта и обеспечивает глобальную точку доступа к ним .</a:t>
-            </a:r>
-          </a:p>
-          <a:p>
-            <a:r>
-              <a:rPr lang="ru-RU" dirty="0">
-                <a:solidFill>
-                  <a:srgbClr val="FFFF00"/>
-                </a:solidFill>
-              </a:rPr>
-              <a:t>Объектный </a:t>
-            </a:r>
+              <a:t>, который представляет собой интерфейс для создания сложного </a:t>
+            </a:r>
+            <a:r>
+              <a:rPr lang="ru-RU" dirty="0" smtClean="0"/>
+              <a:t>объекта.</a:t>
+            </a:r>
+            <a:endParaRPr lang="ru-RU" dirty="0"/>
+          </a:p>
+          <a:p>
             <a:r>
               <a:rPr lang="ru-RU" dirty="0" smtClean="0">
                 <a:solidFill>
                   <a:srgbClr val="FFFF00"/>
                 </a:solidFill>
               </a:rPr>
-              <a:t>пул (Object pool).</a:t>
-            </a:r>
-            <a:r>
-              <a:rPr lang="ru-RU" dirty="0" smtClean="0"/>
-              <a:t> Класс</a:t>
+              <a:t>Фабричный метод (Factory method).</a:t>
+            </a:r>
+            <a:r>
+              <a:rPr lang="ru-RU" dirty="0" smtClean="0"/>
+              <a:t> Определяет </a:t>
             </a:r>
             <a:r>
               <a:rPr lang="ru-RU" dirty="0"/>
-              <a:t>, который представляет собой интерфейс для работы с набором инициализированных и готовых к использованию </a:t>
-            </a:r>
-            <a:r>
-              <a:rPr lang="ru-RU" dirty="0" smtClean="0"/>
-              <a:t>объектов.</a:t>
+              <a:t>интерфейс для создания объекта, но оставляет подклассам решение о том, какой класс </a:t>
+            </a:r>
+            <a:r>
+              <a:rPr lang="ru-RU" dirty="0" smtClean="0"/>
+              <a:t>инстанциировать.</a:t>
             </a:r>
             <a:endParaRPr lang="ru-RU" dirty="0"/>
           </a:p>
           <a:p>
             <a:r>
+              <a:rPr lang="en-US" dirty="0">
+                <a:solidFill>
+                  <a:srgbClr val="FFC000"/>
+                </a:solidFill>
+              </a:rPr>
+              <a:t>[.NET]</a:t>
+            </a:r>
+            <a:r>
+              <a:rPr lang="en-US" dirty="0">
+                <a:solidFill>
+                  <a:schemeClr val="bg1"/>
+                </a:solidFill>
+              </a:rPr>
+              <a:t> </a:t>
+            </a:r>
+            <a:r>
               <a:rPr lang="ru-RU" dirty="0" smtClean="0">
                 <a:solidFill>
                   <a:srgbClr val="FFFF00"/>
                 </a:solidFill>
               </a:rPr>
-              <a:t>Прототип (Prototype).</a:t>
-            </a:r>
-            <a:r>
-              <a:rPr lang="ru-RU" dirty="0" smtClean="0"/>
-              <a:t> Определяет </a:t>
+              <a:t>Отложенная инициализация (Lazy initialization).</a:t>
+            </a:r>
+            <a:r>
+              <a:rPr lang="ru-RU" dirty="0" smtClean="0"/>
+              <a:t> Объект</a:t>
             </a:r>
             <a:r>
               <a:rPr lang="ru-RU" dirty="0"/>
-              <a:t>интерфейс создания объекта через клонирование другого объекта вместо создания через </a:t>
-            </a:r>
-            <a:r>
-              <a:rPr lang="ru-RU" dirty="0" smtClean="0"/>
-              <a:t>конструктор.</a:t>
-            </a:r>
-            <a:endParaRPr lang="ru-RU" dirty="0"/>
-          </a:p>
-          <a:p>
-            <a:r>
-              <a:rPr lang="ru-RU" dirty="0">
-                <a:solidFill>
-                  <a:srgbClr val="FFFF00"/>
-                </a:solidFill>
-              </a:rPr>
-              <a:t>Получение ресурса есть </a:t>
-            </a:r>
-            <a:r>
-              <a:rPr lang="ru-RU" dirty="0" smtClean="0">
-                <a:solidFill>
-                  <a:srgbClr val="FFFF00"/>
-                </a:solidFill>
-              </a:rPr>
-              <a:t>инициализация (Resource </a:t>
-            </a:r>
-            <a:r>
-              <a:rPr lang="ru-RU" dirty="0">
-                <a:solidFill>
-                  <a:srgbClr val="FFFF00"/>
-                </a:solidFill>
-              </a:rPr>
-              <a:t>acquisition is initialization (RAII</a:t>
-            </a:r>
-            <a:r>
-              <a:rPr lang="ru-RU" dirty="0" smtClean="0">
-                <a:solidFill>
-                  <a:srgbClr val="FFFF00"/>
-                </a:solidFill>
-              </a:rPr>
-              <a:t>)).</a:t>
-            </a:r>
-            <a:r>
-              <a:rPr lang="ru-RU" dirty="0" smtClean="0"/>
-              <a:t> Получение </a:t>
-            </a:r>
-            <a:r>
-              <a:rPr lang="ru-RU" dirty="0"/>
-              <a:t>некоторого ресурса совмещается с инициализацией, а освобождение — с уничтожением </a:t>
-            </a:r>
-            <a:r>
-              <a:rPr lang="ru-RU" dirty="0" smtClean="0"/>
-              <a:t>объекта.</a:t>
-            </a:r>
-            <a:endParaRPr lang="ru-RU" dirty="0"/>
+              <a:t>, инициализируемый во время первого обращения к </a:t>
+            </a:r>
+            <a:r>
+              <a:rPr lang="ru-RU" dirty="0" smtClean="0"/>
+              <a:t>нему.</a:t>
+            </a:r>
+            <a:r>
+              <a:rPr lang="en-US" dirty="0" smtClean="0"/>
+              <a:t> </a:t>
+            </a:r>
+            <a:r>
+              <a:rPr lang="en-US" dirty="0" err="1" smtClean="0">
+                <a:solidFill>
+                  <a:srgbClr val="FFC000"/>
+                </a:solidFill>
+              </a:rPr>
+              <a:t>System.Lazy</a:t>
+            </a:r>
+            <a:r>
+              <a:rPr lang="en-US" dirty="0" smtClean="0">
+                <a:solidFill>
+                  <a:srgbClr val="FFC000"/>
+                </a:solidFill>
+              </a:rPr>
+              <a:t>&lt;T&gt;.</a:t>
+            </a:r>
+            <a:endParaRPr lang="ru-RU" dirty="0">
+              <a:solidFill>
+                <a:srgbClr val="FFC000"/>
+              </a:solidFill>
+            </a:endParaRPr>
           </a:p>
         </p:txBody>
       </p:sp>
     </p:spTree>
     <p:extLst>
       <p:ext uri="{BB962C8B-B14F-4D97-AF65-F5344CB8AC3E}">
-        <p14:creationId xmlns:p14="http://schemas.microsoft.com/office/powerpoint/2010/main" val="3876317382"/>
+        <p14:creationId xmlns:p14="http://schemas.microsoft.com/office/powerpoint/2010/main" val="4068049520"/>
       </p:ext>
     </p:extLst>
   </p:cSld>

</xml_diff>